<commit_message>
Izzy prepared to work on big computer
</commit_message>
<xml_diff>
--- a/images/workflow_diagram.pptx
+++ b/images/workflow_diagram.pptx
@@ -3378,15 +3378,7 @@
               <a:cs typeface="Arial" panose="020B0604020202020204" pitchFamily="34" charset="0"/>
               <a:sym typeface="Wingdings" pitchFamily="2" charset="2"/>
             </a:rPr>
-            <a:t> ~ </a:t>
-          </a:r>
-          <a:r>
-            <a:rPr lang="en-US" sz="1600">
-              <a:latin typeface="Arial" panose="020B0604020202020204" pitchFamily="34" charset="0"/>
-              <a:cs typeface="Arial" panose="020B0604020202020204" pitchFamily="34" charset="0"/>
-              <a:sym typeface="Wingdings" pitchFamily="2" charset="2"/>
-            </a:rPr>
-            <a:t>1)*</a:t>
+            <a:t> ~ SPE  + 1)*</a:t>
           </a:r>
           <a:endParaRPr lang="en-US" sz="1600" dirty="0"/>
         </a:p>
@@ -3433,7 +3425,7 @@
               <a:latin typeface="Arial" panose="020B0604020202020204" pitchFamily="34" charset="0"/>
               <a:cs typeface="Arial" panose="020B0604020202020204" pitchFamily="34" charset="0"/>
             </a:rPr>
-            <a:t>1 – testing null model</a:t>
+            <a:t>1, testing null model and SPE event (categorical)</a:t>
           </a:r>
         </a:p>
         <a:p>
@@ -3458,7 +3450,7 @@
               <a:latin typeface="Arial" panose="020B0604020202020204" pitchFamily="34" charset="0"/>
               <a:cs typeface="Arial" panose="020B0604020202020204" pitchFamily="34" charset="0"/>
             </a:rPr>
-            <a:t>*Completed for total land-use change and each land-use transition</a:t>
+            <a:t>*Completed for total land-use change and each transition</a:t>
           </a:r>
           <a:endParaRPr lang="en-US" sz="1400" b="1" dirty="0">
             <a:latin typeface="Arial" panose="020B0604020202020204" pitchFamily="34" charset="0"/>
@@ -3665,7 +3657,7 @@
       <dgm:spPr/>
     </dgm:pt>
     <dgm:pt modelId="{EF1A1E9C-6819-834E-B4A4-D02D71368B94}" type="pres">
-      <dgm:prSet presAssocID="{F13282A0-1868-DD43-8170-9D9888BFF9FD}" presName="childNode" presStyleLbl="node1" presStyleIdx="4" presStyleCnt="6" custScaleY="193411">
+      <dgm:prSet presAssocID="{F13282A0-1868-DD43-8170-9D9888BFF9FD}" presName="childNode" presStyleLbl="node1" presStyleIdx="4" presStyleCnt="6" custScaleY="202589">
         <dgm:presLayoutVars>
           <dgm:bulletEnabled val="1"/>
         </dgm:presLayoutVars>
@@ -6882,15 +6874,7 @@
               <a:cs typeface="Arial" panose="020B0604020202020204" pitchFamily="34" charset="0"/>
               <a:sym typeface="Wingdings" pitchFamily="2" charset="2"/>
             </a:rPr>
-            <a:t> ~ </a:t>
-          </a:r>
-          <a:r>
-            <a:rPr lang="en-US" sz="1600" kern="1200">
-              <a:latin typeface="Arial" panose="020B0604020202020204" pitchFamily="34" charset="0"/>
-              <a:cs typeface="Arial" panose="020B0604020202020204" pitchFamily="34" charset="0"/>
-              <a:sym typeface="Wingdings" pitchFamily="2" charset="2"/>
-            </a:rPr>
-            <a:t>1)*</a:t>
+            <a:t> ~ SPE  + 1)*</a:t>
           </a:r>
           <a:endParaRPr lang="en-US" sz="1600" kern="1200" dirty="0"/>
         </a:p>
@@ -6907,8 +6891,8 @@
       </dsp:nvSpPr>
       <dsp:spPr>
         <a:xfrm>
-          <a:off x="5805289" y="1626189"/>
-          <a:ext cx="2063750" cy="2205314"/>
+          <a:off x="5805289" y="1625815"/>
+          <a:ext cx="2063750" cy="2243766"/>
         </a:xfrm>
         <a:prstGeom prst="roundRect">
           <a:avLst>
@@ -6982,7 +6966,7 @@
               <a:latin typeface="Arial" panose="020B0604020202020204" pitchFamily="34" charset="0"/>
               <a:cs typeface="Arial" panose="020B0604020202020204" pitchFamily="34" charset="0"/>
             </a:rPr>
-            <a:t>1 – testing null model</a:t>
+            <a:t>1, testing null model and SPE event (categorical)</a:t>
           </a:r>
         </a:p>
         <a:p>
@@ -7031,7 +7015,7 @@
               <a:latin typeface="Arial" panose="020B0604020202020204" pitchFamily="34" charset="0"/>
               <a:cs typeface="Arial" panose="020B0604020202020204" pitchFamily="34" charset="0"/>
             </a:rPr>
-            <a:t>*Completed for total land-use change and each land-use transition</a:t>
+            <a:t>*Completed for total land-use change and each transition</a:t>
           </a:r>
           <a:endParaRPr lang="en-US" sz="1400" b="1" kern="1200" dirty="0">
             <a:latin typeface="Arial" panose="020B0604020202020204" pitchFamily="34" charset="0"/>
@@ -7040,8 +7024,8 @@
         </a:p>
       </dsp:txBody>
       <dsp:txXfrm>
-        <a:off x="5865734" y="1686634"/>
-        <a:ext cx="1942860" cy="2084424"/>
+        <a:off x="5865734" y="1686260"/>
+        <a:ext cx="1942860" cy="2122876"/>
       </dsp:txXfrm>
     </dsp:sp>
     <dsp:sp modelId="{34715EC8-EB7F-B14E-87CB-83ED6E14A76E}">
@@ -7051,8 +7035,8 @@
       </dsp:nvSpPr>
       <dsp:spPr>
         <a:xfrm>
-          <a:off x="5805289" y="4006922"/>
-          <a:ext cx="2063750" cy="1140221"/>
+          <a:off x="5805289" y="4039972"/>
+          <a:ext cx="2063750" cy="1107545"/>
         </a:xfrm>
         <a:prstGeom prst="roundRect">
           <a:avLst>
@@ -7142,8 +7126,8 @@
         </a:p>
       </dsp:txBody>
       <dsp:txXfrm>
-        <a:off x="5838685" y="4040318"/>
-        <a:ext cx="1996958" cy="1073429"/>
+        <a:off x="5837728" y="4072411"/>
+        <a:ext cx="1998872" cy="1042667"/>
       </dsp:txXfrm>
     </dsp:sp>
   </dsp:spTree>
@@ -9884,7 +9868,7 @@
           <a:p>
             <a:fld id="{FDB3CEE1-AD7B-8949-9FF2-E081695872FF}" type="datetimeFigureOut">
               <a:rPr lang="en-US" smtClean="0"/>
-              <a:t>3/31/19</a:t>
+              <a:t>4/1/19</a:t>
             </a:fld>
             <a:endParaRPr lang="en-US"/>
           </a:p>
@@ -10082,7 +10066,7 @@
           <a:p>
             <a:fld id="{FDB3CEE1-AD7B-8949-9FF2-E081695872FF}" type="datetimeFigureOut">
               <a:rPr lang="en-US" smtClean="0"/>
-              <a:t>3/31/19</a:t>
+              <a:t>4/1/19</a:t>
             </a:fld>
             <a:endParaRPr lang="en-US"/>
           </a:p>
@@ -10290,7 +10274,7 @@
           <a:p>
             <a:fld id="{FDB3CEE1-AD7B-8949-9FF2-E081695872FF}" type="datetimeFigureOut">
               <a:rPr lang="en-US" smtClean="0"/>
-              <a:t>3/31/19</a:t>
+              <a:t>4/1/19</a:t>
             </a:fld>
             <a:endParaRPr lang="en-US"/>
           </a:p>
@@ -10488,7 +10472,7 @@
           <a:p>
             <a:fld id="{FDB3CEE1-AD7B-8949-9FF2-E081695872FF}" type="datetimeFigureOut">
               <a:rPr lang="en-US" smtClean="0"/>
-              <a:t>3/31/19</a:t>
+              <a:t>4/1/19</a:t>
             </a:fld>
             <a:endParaRPr lang="en-US"/>
           </a:p>
@@ -10763,7 +10747,7 @@
           <a:p>
             <a:fld id="{FDB3CEE1-AD7B-8949-9FF2-E081695872FF}" type="datetimeFigureOut">
               <a:rPr lang="en-US" smtClean="0"/>
-              <a:t>3/31/19</a:t>
+              <a:t>4/1/19</a:t>
             </a:fld>
             <a:endParaRPr lang="en-US"/>
           </a:p>
@@ -11028,7 +11012,7 @@
           <a:p>
             <a:fld id="{FDB3CEE1-AD7B-8949-9FF2-E081695872FF}" type="datetimeFigureOut">
               <a:rPr lang="en-US" smtClean="0"/>
-              <a:t>3/31/19</a:t>
+              <a:t>4/1/19</a:t>
             </a:fld>
             <a:endParaRPr lang="en-US"/>
           </a:p>
@@ -11440,7 +11424,7 @@
           <a:p>
             <a:fld id="{FDB3CEE1-AD7B-8949-9FF2-E081695872FF}" type="datetimeFigureOut">
               <a:rPr lang="en-US" smtClean="0"/>
-              <a:t>3/31/19</a:t>
+              <a:t>4/1/19</a:t>
             </a:fld>
             <a:endParaRPr lang="en-US"/>
           </a:p>
@@ -11581,7 +11565,7 @@
           <a:p>
             <a:fld id="{FDB3CEE1-AD7B-8949-9FF2-E081695872FF}" type="datetimeFigureOut">
               <a:rPr lang="en-US" smtClean="0"/>
-              <a:t>3/31/19</a:t>
+              <a:t>4/1/19</a:t>
             </a:fld>
             <a:endParaRPr lang="en-US"/>
           </a:p>
@@ -11694,7 +11678,7 @@
           <a:p>
             <a:fld id="{FDB3CEE1-AD7B-8949-9FF2-E081695872FF}" type="datetimeFigureOut">
               <a:rPr lang="en-US" smtClean="0"/>
-              <a:t>3/31/19</a:t>
+              <a:t>4/1/19</a:t>
             </a:fld>
             <a:endParaRPr lang="en-US"/>
           </a:p>
@@ -12005,7 +11989,7 @@
           <a:p>
             <a:fld id="{FDB3CEE1-AD7B-8949-9FF2-E081695872FF}" type="datetimeFigureOut">
               <a:rPr lang="en-US" smtClean="0"/>
-              <a:t>3/31/19</a:t>
+              <a:t>4/1/19</a:t>
             </a:fld>
             <a:endParaRPr lang="en-US"/>
           </a:p>
@@ -12293,7 +12277,7 @@
           <a:p>
             <a:fld id="{FDB3CEE1-AD7B-8949-9FF2-E081695872FF}" type="datetimeFigureOut">
               <a:rPr lang="en-US" smtClean="0"/>
-              <a:t>3/31/19</a:t>
+              <a:t>4/1/19</a:t>
             </a:fld>
             <a:endParaRPr lang="en-US"/>
           </a:p>
@@ -12534,7 +12518,7 @@
           <a:p>
             <a:fld id="{FDB3CEE1-AD7B-8949-9FF2-E081695872FF}" type="datetimeFigureOut">
               <a:rPr lang="en-US" smtClean="0"/>
-              <a:t>3/31/19</a:t>
+              <a:t>4/1/19</a:t>
             </a:fld>
             <a:endParaRPr lang="en-US"/>
           </a:p>
@@ -13060,7 +13044,7 @@
           <p:nvPr>
             <p:extLst>
               <p:ext uri="{D42A27DB-BD31-4B8C-83A1-F6EECF244321}">
-                <p14:modId xmlns:p14="http://schemas.microsoft.com/office/powerpoint/2010/main" val="2255141090"/>
+                <p14:modId xmlns:p14="http://schemas.microsoft.com/office/powerpoint/2010/main" val="3852387014"/>
               </p:ext>
             </p:extLst>
           </p:nvPr>

</xml_diff>

<commit_message>
Izzy is fixing stats
</commit_message>
<xml_diff>
--- a/images/workflow_diagram.pptx
+++ b/images/workflow_diagram.pptx
@@ -10,6 +10,7 @@
     <p:sldId id="259" r:id="rId4"/>
     <p:sldId id="261" r:id="rId5"/>
     <p:sldId id="260" r:id="rId6"/>
+    <p:sldId id="262" r:id="rId7"/>
   </p:sldIdLst>
   <p:sldSz cx="12192000" cy="6858000"/>
   <p:notesSz cx="6858000" cy="9144000"/>
@@ -27426,7 +27427,7 @@
           <a:p>
             <a:fld id="{FDB3CEE1-AD7B-8949-9FF2-E081695872FF}" type="datetimeFigureOut">
               <a:rPr lang="en-US" smtClean="0"/>
-              <a:t>4/12/19</a:t>
+              <a:t>4/13/19</a:t>
             </a:fld>
             <a:endParaRPr lang="en-US"/>
           </a:p>
@@ -27624,7 +27625,7 @@
           <a:p>
             <a:fld id="{FDB3CEE1-AD7B-8949-9FF2-E081695872FF}" type="datetimeFigureOut">
               <a:rPr lang="en-US" smtClean="0"/>
-              <a:t>4/12/19</a:t>
+              <a:t>4/13/19</a:t>
             </a:fld>
             <a:endParaRPr lang="en-US"/>
           </a:p>
@@ -27832,7 +27833,7 @@
           <a:p>
             <a:fld id="{FDB3CEE1-AD7B-8949-9FF2-E081695872FF}" type="datetimeFigureOut">
               <a:rPr lang="en-US" smtClean="0"/>
-              <a:t>4/12/19</a:t>
+              <a:t>4/13/19</a:t>
             </a:fld>
             <a:endParaRPr lang="en-US"/>
           </a:p>
@@ -28030,7 +28031,7 @@
           <a:p>
             <a:fld id="{FDB3CEE1-AD7B-8949-9FF2-E081695872FF}" type="datetimeFigureOut">
               <a:rPr lang="en-US" smtClean="0"/>
-              <a:t>4/12/19</a:t>
+              <a:t>4/13/19</a:t>
             </a:fld>
             <a:endParaRPr lang="en-US"/>
           </a:p>
@@ -28305,7 +28306,7 @@
           <a:p>
             <a:fld id="{FDB3CEE1-AD7B-8949-9FF2-E081695872FF}" type="datetimeFigureOut">
               <a:rPr lang="en-US" smtClean="0"/>
-              <a:t>4/12/19</a:t>
+              <a:t>4/13/19</a:t>
             </a:fld>
             <a:endParaRPr lang="en-US"/>
           </a:p>
@@ -28570,7 +28571,7 @@
           <a:p>
             <a:fld id="{FDB3CEE1-AD7B-8949-9FF2-E081695872FF}" type="datetimeFigureOut">
               <a:rPr lang="en-US" smtClean="0"/>
-              <a:t>4/12/19</a:t>
+              <a:t>4/13/19</a:t>
             </a:fld>
             <a:endParaRPr lang="en-US"/>
           </a:p>
@@ -28982,7 +28983,7 @@
           <a:p>
             <a:fld id="{FDB3CEE1-AD7B-8949-9FF2-E081695872FF}" type="datetimeFigureOut">
               <a:rPr lang="en-US" smtClean="0"/>
-              <a:t>4/12/19</a:t>
+              <a:t>4/13/19</a:t>
             </a:fld>
             <a:endParaRPr lang="en-US"/>
           </a:p>
@@ -29123,7 +29124,7 @@
           <a:p>
             <a:fld id="{FDB3CEE1-AD7B-8949-9FF2-E081695872FF}" type="datetimeFigureOut">
               <a:rPr lang="en-US" smtClean="0"/>
-              <a:t>4/12/19</a:t>
+              <a:t>4/13/19</a:t>
             </a:fld>
             <a:endParaRPr lang="en-US"/>
           </a:p>
@@ -29236,7 +29237,7 @@
           <a:p>
             <a:fld id="{FDB3CEE1-AD7B-8949-9FF2-E081695872FF}" type="datetimeFigureOut">
               <a:rPr lang="en-US" smtClean="0"/>
-              <a:t>4/12/19</a:t>
+              <a:t>4/13/19</a:t>
             </a:fld>
             <a:endParaRPr lang="en-US"/>
           </a:p>
@@ -29547,7 +29548,7 @@
           <a:p>
             <a:fld id="{FDB3CEE1-AD7B-8949-9FF2-E081695872FF}" type="datetimeFigureOut">
               <a:rPr lang="en-US" smtClean="0"/>
-              <a:t>4/12/19</a:t>
+              <a:t>4/13/19</a:t>
             </a:fld>
             <a:endParaRPr lang="en-US"/>
           </a:p>
@@ -29835,7 +29836,7 @@
           <a:p>
             <a:fld id="{FDB3CEE1-AD7B-8949-9FF2-E081695872FF}" type="datetimeFigureOut">
               <a:rPr lang="en-US" smtClean="0"/>
-              <a:t>4/12/19</a:t>
+              <a:t>4/13/19</a:t>
             </a:fld>
             <a:endParaRPr lang="en-US"/>
           </a:p>
@@ -30076,7 +30077,7 @@
           <a:p>
             <a:fld id="{FDB3CEE1-AD7B-8949-9FF2-E081695872FF}" type="datetimeFigureOut">
               <a:rPr lang="en-US" smtClean="0"/>
-              <a:t>4/12/19</a:t>
+              <a:t>4/13/19</a:t>
             </a:fld>
             <a:endParaRPr lang="en-US"/>
           </a:p>
@@ -31191,6 +31192,1187 @@
 </p:sld>
 </file>
 
+<file path=ppt/slides/slide6.xml><?xml version="1.0" encoding="utf-8"?>
+<p:sld xmlns:a="http://schemas.openxmlformats.org/drawingml/2006/main" xmlns:r="http://schemas.openxmlformats.org/officeDocument/2006/relationships" xmlns:p="http://schemas.openxmlformats.org/presentationml/2006/main">
+  <p:cSld>
+    <p:spTree>
+      <p:nvGrpSpPr>
+        <p:cNvPr id="1" name=""/>
+        <p:cNvGrpSpPr/>
+        <p:nvPr/>
+      </p:nvGrpSpPr>
+      <p:grpSpPr>
+        <a:xfrm>
+          <a:off x="0" y="0"/>
+          <a:ext cx="0" cy="0"/>
+          <a:chOff x="0" y="0"/>
+          <a:chExt cx="0" cy="0"/>
+        </a:xfrm>
+      </p:grpSpPr>
+      <p:grpSp>
+        <p:nvGrpSpPr>
+          <p:cNvPr id="49" name="Group 48">
+            <a:extLst>
+              <a:ext uri="{FF2B5EF4-FFF2-40B4-BE49-F238E27FC236}">
+                <a16:creationId xmlns:a16="http://schemas.microsoft.com/office/drawing/2014/main" id="{12745D3E-631D-A448-A0A2-B14D31B084B8}"/>
+              </a:ext>
+            </a:extLst>
+          </p:cNvPr>
+          <p:cNvGrpSpPr/>
+          <p:nvPr/>
+        </p:nvGrpSpPr>
+        <p:grpSpPr>
+          <a:xfrm>
+            <a:off x="2572583" y="656542"/>
+            <a:ext cx="5650833" cy="5544915"/>
+            <a:chOff x="2989625" y="-305126"/>
+            <a:chExt cx="5650833" cy="5544915"/>
+          </a:xfrm>
+        </p:grpSpPr>
+        <p:grpSp>
+          <p:nvGrpSpPr>
+            <p:cNvPr id="32" name="Group 31">
+              <a:extLst>
+                <a:ext uri="{FF2B5EF4-FFF2-40B4-BE49-F238E27FC236}">
+                  <a16:creationId xmlns:a16="http://schemas.microsoft.com/office/drawing/2014/main" id="{55797877-2484-A845-9561-AC4D657323B3}"/>
+                </a:ext>
+              </a:extLst>
+            </p:cNvPr>
+            <p:cNvGrpSpPr/>
+            <p:nvPr/>
+          </p:nvGrpSpPr>
+          <p:grpSpPr>
+            <a:xfrm>
+              <a:off x="2989625" y="-305126"/>
+              <a:ext cx="2164369" cy="2095517"/>
+              <a:chOff x="388211" y="1382006"/>
+              <a:chExt cx="3798778" cy="3703342"/>
+            </a:xfrm>
+          </p:grpSpPr>
+          <p:sp>
+            <p:nvSpPr>
+              <p:cNvPr id="4" name="Rectangle 3">
+                <a:extLst>
+                  <a:ext uri="{FF2B5EF4-FFF2-40B4-BE49-F238E27FC236}">
+                    <a16:creationId xmlns:a16="http://schemas.microsoft.com/office/drawing/2014/main" id="{E115F160-214D-9040-9711-D52007D3C5BF}"/>
+                  </a:ext>
+                </a:extLst>
+              </p:cNvPr>
+              <p:cNvSpPr/>
+              <p:nvPr/>
+            </p:nvSpPr>
+            <p:spPr>
+              <a:xfrm>
+                <a:off x="1129685" y="2037346"/>
+                <a:ext cx="3048000" cy="3048000"/>
+              </a:xfrm>
+              <a:prstGeom prst="rect">
+                <a:avLst/>
+              </a:prstGeom>
+              <a:solidFill>
+                <a:schemeClr val="accent6">
+                  <a:lumMod val="50000"/>
+                </a:schemeClr>
+              </a:solidFill>
+              <a:ln>
+                <a:solidFill>
+                  <a:schemeClr val="tx1"/>
+                </a:solidFill>
+              </a:ln>
+            </p:spPr>
+            <p:style>
+              <a:lnRef idx="2">
+                <a:schemeClr val="accent1">
+                  <a:shade val="50000"/>
+                </a:schemeClr>
+              </a:lnRef>
+              <a:fillRef idx="1">
+                <a:schemeClr val="accent1"/>
+              </a:fillRef>
+              <a:effectRef idx="0">
+                <a:schemeClr val="accent1"/>
+              </a:effectRef>
+              <a:fontRef idx="minor">
+                <a:schemeClr val="lt1"/>
+              </a:fontRef>
+            </p:style>
+            <p:txBody>
+              <a:bodyPr rtlCol="0" anchor="ctr"/>
+              <a:lstStyle/>
+              <a:p>
+                <a:pPr algn="ctr"/>
+                <a:endParaRPr lang="en-US" sz="1400" dirty="0"/>
+              </a:p>
+            </p:txBody>
+          </p:sp>
+          <p:grpSp>
+            <p:nvGrpSpPr>
+              <p:cNvPr id="25" name="Group 24">
+                <a:extLst>
+                  <a:ext uri="{FF2B5EF4-FFF2-40B4-BE49-F238E27FC236}">
+                    <a16:creationId xmlns:a16="http://schemas.microsoft.com/office/drawing/2014/main" id="{455A451C-B702-2440-9DA6-B98134BCDA44}"/>
+                  </a:ext>
+                </a:extLst>
+              </p:cNvPr>
+              <p:cNvGrpSpPr/>
+              <p:nvPr/>
+            </p:nvGrpSpPr>
+            <p:grpSpPr>
+              <a:xfrm>
+                <a:off x="1138989" y="1382006"/>
+                <a:ext cx="3048000" cy="570617"/>
+                <a:chOff x="1138989" y="1382006"/>
+                <a:chExt cx="3048000" cy="570617"/>
+              </a:xfrm>
+            </p:grpSpPr>
+            <p:grpSp>
+              <p:nvGrpSpPr>
+                <p:cNvPr id="13" name="Group 12">
+                  <a:extLst>
+                    <a:ext uri="{FF2B5EF4-FFF2-40B4-BE49-F238E27FC236}">
+                      <a16:creationId xmlns:a16="http://schemas.microsoft.com/office/drawing/2014/main" id="{A1956B2B-B87F-FB41-A445-1D213588F172}"/>
+                    </a:ext>
+                  </a:extLst>
+                </p:cNvPr>
+                <p:cNvGrpSpPr/>
+                <p:nvPr/>
+              </p:nvGrpSpPr>
+              <p:grpSpPr>
+                <a:xfrm>
+                  <a:off x="1138989" y="1676397"/>
+                  <a:ext cx="3048000" cy="276226"/>
+                  <a:chOff x="1138989" y="1690685"/>
+                  <a:chExt cx="3048000" cy="276226"/>
+                </a:xfrm>
+              </p:grpSpPr>
+              <p:cxnSp>
+                <p:nvCxnSpPr>
+                  <p:cNvPr id="8" name="Straight Connector 7">
+                    <a:extLst>
+                      <a:ext uri="{FF2B5EF4-FFF2-40B4-BE49-F238E27FC236}">
+                        <a16:creationId xmlns:a16="http://schemas.microsoft.com/office/drawing/2014/main" id="{248B1FDE-2304-5249-929B-59E86C17F48B}"/>
+                      </a:ext>
+                    </a:extLst>
+                  </p:cNvPr>
+                  <p:cNvCxnSpPr/>
+                  <p:nvPr/>
+                </p:nvCxnSpPr>
+                <p:spPr>
+                  <a:xfrm>
+                    <a:off x="1138989" y="1828800"/>
+                    <a:ext cx="3048000" cy="0"/>
+                  </a:xfrm>
+                  <a:prstGeom prst="line">
+                    <a:avLst/>
+                  </a:prstGeom>
+                  <a:ln>
+                    <a:solidFill>
+                      <a:schemeClr val="tx1"/>
+                    </a:solidFill>
+                  </a:ln>
+                </p:spPr>
+                <p:style>
+                  <a:lnRef idx="1">
+                    <a:schemeClr val="accent1"/>
+                  </a:lnRef>
+                  <a:fillRef idx="0">
+                    <a:schemeClr val="accent1"/>
+                  </a:fillRef>
+                  <a:effectRef idx="0">
+                    <a:schemeClr val="accent1"/>
+                  </a:effectRef>
+                  <a:fontRef idx="minor">
+                    <a:schemeClr val="tx1"/>
+                  </a:fontRef>
+                </p:style>
+              </p:cxnSp>
+              <p:cxnSp>
+                <p:nvCxnSpPr>
+                  <p:cNvPr id="9" name="Straight Connector 8">
+                    <a:extLst>
+                      <a:ext uri="{FF2B5EF4-FFF2-40B4-BE49-F238E27FC236}">
+                        <a16:creationId xmlns:a16="http://schemas.microsoft.com/office/drawing/2014/main" id="{349B7039-B09F-B348-8C1D-FBEF118EA67A}"/>
+                      </a:ext>
+                    </a:extLst>
+                  </p:cNvPr>
+                  <p:cNvCxnSpPr>
+                    <a:cxnSpLocks/>
+                  </p:cNvCxnSpPr>
+                  <p:nvPr/>
+                </p:nvCxnSpPr>
+                <p:spPr>
+                  <a:xfrm flipV="1">
+                    <a:off x="1138989" y="1690685"/>
+                    <a:ext cx="0" cy="276225"/>
+                  </a:xfrm>
+                  <a:prstGeom prst="line">
+                    <a:avLst/>
+                  </a:prstGeom>
+                  <a:ln>
+                    <a:solidFill>
+                      <a:schemeClr val="tx1"/>
+                    </a:solidFill>
+                  </a:ln>
+                </p:spPr>
+                <p:style>
+                  <a:lnRef idx="1">
+                    <a:schemeClr val="accent1"/>
+                  </a:lnRef>
+                  <a:fillRef idx="0">
+                    <a:schemeClr val="accent1"/>
+                  </a:fillRef>
+                  <a:effectRef idx="0">
+                    <a:schemeClr val="accent1"/>
+                  </a:effectRef>
+                  <a:fontRef idx="minor">
+                    <a:schemeClr val="tx1"/>
+                  </a:fontRef>
+                </p:style>
+              </p:cxnSp>
+              <p:cxnSp>
+                <p:nvCxnSpPr>
+                  <p:cNvPr id="12" name="Straight Connector 11">
+                    <a:extLst>
+                      <a:ext uri="{FF2B5EF4-FFF2-40B4-BE49-F238E27FC236}">
+                        <a16:creationId xmlns:a16="http://schemas.microsoft.com/office/drawing/2014/main" id="{49674479-33A3-8E4F-9BD0-CF5B90A2C29F}"/>
+                      </a:ext>
+                    </a:extLst>
+                  </p:cNvPr>
+                  <p:cNvCxnSpPr>
+                    <a:cxnSpLocks/>
+                  </p:cNvCxnSpPr>
+                  <p:nvPr/>
+                </p:nvCxnSpPr>
+                <p:spPr>
+                  <a:xfrm flipV="1">
+                    <a:off x="4186989" y="1690686"/>
+                    <a:ext cx="0" cy="276225"/>
+                  </a:xfrm>
+                  <a:prstGeom prst="line">
+                    <a:avLst/>
+                  </a:prstGeom>
+                  <a:ln>
+                    <a:solidFill>
+                      <a:schemeClr val="tx1"/>
+                    </a:solidFill>
+                  </a:ln>
+                </p:spPr>
+                <p:style>
+                  <a:lnRef idx="1">
+                    <a:schemeClr val="accent1"/>
+                  </a:lnRef>
+                  <a:fillRef idx="0">
+                    <a:schemeClr val="accent1"/>
+                  </a:fillRef>
+                  <a:effectRef idx="0">
+                    <a:schemeClr val="accent1"/>
+                  </a:effectRef>
+                  <a:fontRef idx="minor">
+                    <a:schemeClr val="tx1"/>
+                  </a:fontRef>
+                </p:style>
+              </p:cxnSp>
+            </p:grpSp>
+            <p:sp>
+              <p:nvSpPr>
+                <p:cNvPr id="14" name="TextBox 13">
+                  <a:extLst>
+                    <a:ext uri="{FF2B5EF4-FFF2-40B4-BE49-F238E27FC236}">
+                      <a16:creationId xmlns:a16="http://schemas.microsoft.com/office/drawing/2014/main" id="{4394CB03-AD97-8243-B52D-564A594F4663}"/>
+                    </a:ext>
+                  </a:extLst>
+                </p:cNvPr>
+                <p:cNvSpPr txBox="1"/>
+                <p:nvPr/>
+              </p:nvSpPr>
+              <p:spPr>
+                <a:xfrm>
+                  <a:off x="1737614" y="1382006"/>
+                  <a:ext cx="1850749" cy="543924"/>
+                </a:xfrm>
+                <a:prstGeom prst="rect">
+                  <a:avLst/>
+                </a:prstGeom>
+                <a:noFill/>
+              </p:spPr>
+              <p:txBody>
+                <a:bodyPr wrap="square" rtlCol="0">
+                  <a:spAutoFit/>
+                </a:bodyPr>
+                <a:lstStyle/>
+                <a:p>
+                  <a:r>
+                    <a:rPr lang="en-US" sz="1400" dirty="0">
+                      <a:latin typeface="Helvetica" pitchFamily="2" charset="0"/>
+                    </a:rPr>
+                    <a:t>30 metres </a:t>
+                  </a:r>
+                </a:p>
+              </p:txBody>
+            </p:sp>
+          </p:grpSp>
+          <p:grpSp>
+            <p:nvGrpSpPr>
+              <p:cNvPr id="26" name="Group 25">
+                <a:extLst>
+                  <a:ext uri="{FF2B5EF4-FFF2-40B4-BE49-F238E27FC236}">
+                    <a16:creationId xmlns:a16="http://schemas.microsoft.com/office/drawing/2014/main" id="{0E0C1B1F-421F-5241-B2F7-25B4FF2DBD8B}"/>
+                  </a:ext>
+                </a:extLst>
+              </p:cNvPr>
+              <p:cNvGrpSpPr/>
+              <p:nvPr/>
+            </p:nvGrpSpPr>
+            <p:grpSpPr>
+              <a:xfrm rot="16200000">
+                <a:off x="-788243" y="3213802"/>
+                <a:ext cx="3048000" cy="695091"/>
+                <a:chOff x="1138989" y="1257532"/>
+                <a:chExt cx="3048000" cy="695091"/>
+              </a:xfrm>
+            </p:grpSpPr>
+            <p:grpSp>
+              <p:nvGrpSpPr>
+                <p:cNvPr id="27" name="Group 26">
+                  <a:extLst>
+                    <a:ext uri="{FF2B5EF4-FFF2-40B4-BE49-F238E27FC236}">
+                      <a16:creationId xmlns:a16="http://schemas.microsoft.com/office/drawing/2014/main" id="{D48C7F0F-3598-3C4D-B36A-8AC2F436DB2B}"/>
+                    </a:ext>
+                  </a:extLst>
+                </p:cNvPr>
+                <p:cNvGrpSpPr/>
+                <p:nvPr/>
+              </p:nvGrpSpPr>
+              <p:grpSpPr>
+                <a:xfrm>
+                  <a:off x="1138989" y="1676397"/>
+                  <a:ext cx="3048000" cy="276226"/>
+                  <a:chOff x="1138989" y="1690685"/>
+                  <a:chExt cx="3048000" cy="276226"/>
+                </a:xfrm>
+              </p:grpSpPr>
+              <p:cxnSp>
+                <p:nvCxnSpPr>
+                  <p:cNvPr id="29" name="Straight Connector 28">
+                    <a:extLst>
+                      <a:ext uri="{FF2B5EF4-FFF2-40B4-BE49-F238E27FC236}">
+                        <a16:creationId xmlns:a16="http://schemas.microsoft.com/office/drawing/2014/main" id="{88146BA2-CA3A-864A-8A7D-82303BFF5000}"/>
+                      </a:ext>
+                    </a:extLst>
+                  </p:cNvPr>
+                  <p:cNvCxnSpPr/>
+                  <p:nvPr/>
+                </p:nvCxnSpPr>
+                <p:spPr>
+                  <a:xfrm>
+                    <a:off x="1138989" y="1828800"/>
+                    <a:ext cx="3048000" cy="0"/>
+                  </a:xfrm>
+                  <a:prstGeom prst="line">
+                    <a:avLst/>
+                  </a:prstGeom>
+                  <a:ln>
+                    <a:solidFill>
+                      <a:schemeClr val="tx1"/>
+                    </a:solidFill>
+                  </a:ln>
+                </p:spPr>
+                <p:style>
+                  <a:lnRef idx="1">
+                    <a:schemeClr val="accent1"/>
+                  </a:lnRef>
+                  <a:fillRef idx="0">
+                    <a:schemeClr val="accent1"/>
+                  </a:fillRef>
+                  <a:effectRef idx="0">
+                    <a:schemeClr val="accent1"/>
+                  </a:effectRef>
+                  <a:fontRef idx="minor">
+                    <a:schemeClr val="tx1"/>
+                  </a:fontRef>
+                </p:style>
+              </p:cxnSp>
+              <p:cxnSp>
+                <p:nvCxnSpPr>
+                  <p:cNvPr id="30" name="Straight Connector 29">
+                    <a:extLst>
+                      <a:ext uri="{FF2B5EF4-FFF2-40B4-BE49-F238E27FC236}">
+                        <a16:creationId xmlns:a16="http://schemas.microsoft.com/office/drawing/2014/main" id="{17D7BB3E-7D25-494B-BA45-B511EEE2DF9C}"/>
+                      </a:ext>
+                    </a:extLst>
+                  </p:cNvPr>
+                  <p:cNvCxnSpPr>
+                    <a:cxnSpLocks/>
+                  </p:cNvCxnSpPr>
+                  <p:nvPr/>
+                </p:nvCxnSpPr>
+                <p:spPr>
+                  <a:xfrm flipV="1">
+                    <a:off x="1138989" y="1690685"/>
+                    <a:ext cx="0" cy="276225"/>
+                  </a:xfrm>
+                  <a:prstGeom prst="line">
+                    <a:avLst/>
+                  </a:prstGeom>
+                  <a:ln>
+                    <a:solidFill>
+                      <a:schemeClr val="tx1"/>
+                    </a:solidFill>
+                  </a:ln>
+                </p:spPr>
+                <p:style>
+                  <a:lnRef idx="1">
+                    <a:schemeClr val="accent1"/>
+                  </a:lnRef>
+                  <a:fillRef idx="0">
+                    <a:schemeClr val="accent1"/>
+                  </a:fillRef>
+                  <a:effectRef idx="0">
+                    <a:schemeClr val="accent1"/>
+                  </a:effectRef>
+                  <a:fontRef idx="minor">
+                    <a:schemeClr val="tx1"/>
+                  </a:fontRef>
+                </p:style>
+              </p:cxnSp>
+              <p:cxnSp>
+                <p:nvCxnSpPr>
+                  <p:cNvPr id="31" name="Straight Connector 30">
+                    <a:extLst>
+                      <a:ext uri="{FF2B5EF4-FFF2-40B4-BE49-F238E27FC236}">
+                        <a16:creationId xmlns:a16="http://schemas.microsoft.com/office/drawing/2014/main" id="{F2695BA4-5D90-BD4E-A9CE-6EBB4BC8B6FC}"/>
+                      </a:ext>
+                    </a:extLst>
+                  </p:cNvPr>
+                  <p:cNvCxnSpPr>
+                    <a:cxnSpLocks/>
+                  </p:cNvCxnSpPr>
+                  <p:nvPr/>
+                </p:nvCxnSpPr>
+                <p:spPr>
+                  <a:xfrm flipV="1">
+                    <a:off x="4186989" y="1690686"/>
+                    <a:ext cx="0" cy="276225"/>
+                  </a:xfrm>
+                  <a:prstGeom prst="line">
+                    <a:avLst/>
+                  </a:prstGeom>
+                  <a:ln>
+                    <a:solidFill>
+                      <a:schemeClr val="tx1"/>
+                    </a:solidFill>
+                  </a:ln>
+                </p:spPr>
+                <p:style>
+                  <a:lnRef idx="1">
+                    <a:schemeClr val="accent1"/>
+                  </a:lnRef>
+                  <a:fillRef idx="0">
+                    <a:schemeClr val="accent1"/>
+                  </a:fillRef>
+                  <a:effectRef idx="0">
+                    <a:schemeClr val="accent1"/>
+                  </a:effectRef>
+                  <a:fontRef idx="minor">
+                    <a:schemeClr val="tx1"/>
+                  </a:fontRef>
+                </p:style>
+              </p:cxnSp>
+            </p:grpSp>
+            <p:sp>
+              <p:nvSpPr>
+                <p:cNvPr id="28" name="TextBox 27">
+                  <a:extLst>
+                    <a:ext uri="{FF2B5EF4-FFF2-40B4-BE49-F238E27FC236}">
+                      <a16:creationId xmlns:a16="http://schemas.microsoft.com/office/drawing/2014/main" id="{BDD57972-473D-BD47-A89C-1712EDBBAFF8}"/>
+                    </a:ext>
+                  </a:extLst>
+                </p:cNvPr>
+                <p:cNvSpPr txBox="1"/>
+                <p:nvPr/>
+              </p:nvSpPr>
+              <p:spPr>
+                <a:xfrm>
+                  <a:off x="1733187" y="1257532"/>
+                  <a:ext cx="1859607" cy="540192"/>
+                </a:xfrm>
+                <a:prstGeom prst="rect">
+                  <a:avLst/>
+                </a:prstGeom>
+                <a:noFill/>
+              </p:spPr>
+              <p:txBody>
+                <a:bodyPr wrap="square" rtlCol="0">
+                  <a:spAutoFit/>
+                </a:bodyPr>
+                <a:lstStyle/>
+                <a:p>
+                  <a:r>
+                    <a:rPr lang="en-US" sz="1400" dirty="0">
+                      <a:latin typeface="Helvetica" pitchFamily="2" charset="0"/>
+                    </a:rPr>
+                    <a:t>30 metres </a:t>
+                  </a:r>
+                </a:p>
+              </p:txBody>
+            </p:sp>
+          </p:grpSp>
+        </p:grpSp>
+        <p:sp>
+          <p:nvSpPr>
+            <p:cNvPr id="36" name="Rectangle 35">
+              <a:extLst>
+                <a:ext uri="{FF2B5EF4-FFF2-40B4-BE49-F238E27FC236}">
+                  <a16:creationId xmlns:a16="http://schemas.microsoft.com/office/drawing/2014/main" id="{411D5D6F-C44B-F442-AD05-8C148C1E1190}"/>
+                </a:ext>
+              </a:extLst>
+            </p:cNvPr>
+            <p:cNvSpPr/>
+            <p:nvPr/>
+          </p:nvSpPr>
+          <p:spPr>
+            <a:xfrm>
+              <a:off x="5157207" y="1790398"/>
+              <a:ext cx="1736610" cy="1724695"/>
+            </a:xfrm>
+            <a:prstGeom prst="rect">
+              <a:avLst/>
+            </a:prstGeom>
+            <a:solidFill>
+              <a:schemeClr val="accent6">
+                <a:lumMod val="50000"/>
+              </a:schemeClr>
+            </a:solidFill>
+            <a:ln>
+              <a:solidFill>
+                <a:schemeClr val="tx1"/>
+              </a:solidFill>
+            </a:ln>
+          </p:spPr>
+          <p:style>
+            <a:lnRef idx="2">
+              <a:schemeClr val="accent1">
+                <a:shade val="50000"/>
+              </a:schemeClr>
+            </a:lnRef>
+            <a:fillRef idx="1">
+              <a:schemeClr val="accent1"/>
+            </a:fillRef>
+            <a:effectRef idx="0">
+              <a:schemeClr val="accent1"/>
+            </a:effectRef>
+            <a:fontRef idx="minor">
+              <a:schemeClr val="lt1"/>
+            </a:fontRef>
+          </p:style>
+          <p:txBody>
+            <a:bodyPr rtlCol="0" anchor="ctr"/>
+            <a:lstStyle/>
+            <a:p>
+              <a:pPr algn="ctr"/>
+              <a:endParaRPr lang="en-US" sz="1400" dirty="0"/>
+            </a:p>
+          </p:txBody>
+        </p:sp>
+        <p:sp>
+          <p:nvSpPr>
+            <p:cNvPr id="33" name="Oval 32">
+              <a:extLst>
+                <a:ext uri="{FF2B5EF4-FFF2-40B4-BE49-F238E27FC236}">
+                  <a16:creationId xmlns:a16="http://schemas.microsoft.com/office/drawing/2014/main" id="{98CA76CC-2CE7-DF40-B41F-A3B06040D48A}"/>
+                </a:ext>
+              </a:extLst>
+            </p:cNvPr>
+            <p:cNvSpPr/>
+            <p:nvPr/>
+          </p:nvSpPr>
+          <p:spPr>
+            <a:xfrm flipV="1">
+              <a:off x="5872530" y="2648197"/>
+              <a:ext cx="223470" cy="186291"/>
+            </a:xfrm>
+            <a:prstGeom prst="ellipse">
+              <a:avLst/>
+            </a:prstGeom>
+            <a:solidFill>
+              <a:schemeClr val="tx1">
+                <a:lumMod val="95000"/>
+                <a:lumOff val="5000"/>
+              </a:schemeClr>
+            </a:solidFill>
+            <a:ln>
+              <a:solidFill>
+                <a:schemeClr val="tx1"/>
+              </a:solidFill>
+            </a:ln>
+          </p:spPr>
+          <p:style>
+            <a:lnRef idx="2">
+              <a:schemeClr val="accent1">
+                <a:shade val="50000"/>
+              </a:schemeClr>
+            </a:lnRef>
+            <a:fillRef idx="1">
+              <a:schemeClr val="accent1"/>
+            </a:fillRef>
+            <a:effectRef idx="0">
+              <a:schemeClr val="accent1"/>
+            </a:effectRef>
+            <a:fontRef idx="minor">
+              <a:schemeClr val="lt1"/>
+            </a:fontRef>
+          </p:style>
+          <p:txBody>
+            <a:bodyPr rtlCol="0" anchor="ctr"/>
+            <a:lstStyle/>
+            <a:p>
+              <a:pPr algn="ctr"/>
+              <a:endParaRPr lang="en-US"/>
+            </a:p>
+          </p:txBody>
+        </p:sp>
+        <p:sp>
+          <p:nvSpPr>
+            <p:cNvPr id="37" name="Rectangle 36">
+              <a:extLst>
+                <a:ext uri="{FF2B5EF4-FFF2-40B4-BE49-F238E27FC236}">
+                  <a16:creationId xmlns:a16="http://schemas.microsoft.com/office/drawing/2014/main" id="{A6698F77-92D9-DD4E-85F1-B1E1868D3790}"/>
+                </a:ext>
+              </a:extLst>
+            </p:cNvPr>
+            <p:cNvSpPr/>
+            <p:nvPr/>
+          </p:nvSpPr>
+          <p:spPr>
+            <a:xfrm>
+              <a:off x="6894484" y="1790399"/>
+              <a:ext cx="1736610" cy="1724695"/>
+            </a:xfrm>
+            <a:prstGeom prst="rect">
+              <a:avLst/>
+            </a:prstGeom>
+            <a:solidFill>
+              <a:schemeClr val="accent6">
+                <a:lumMod val="50000"/>
+              </a:schemeClr>
+            </a:solidFill>
+            <a:ln>
+              <a:solidFill>
+                <a:schemeClr val="tx1"/>
+              </a:solidFill>
+            </a:ln>
+          </p:spPr>
+          <p:style>
+            <a:lnRef idx="2">
+              <a:schemeClr val="accent1">
+                <a:shade val="50000"/>
+              </a:schemeClr>
+            </a:lnRef>
+            <a:fillRef idx="1">
+              <a:schemeClr val="accent1"/>
+            </a:fillRef>
+            <a:effectRef idx="0">
+              <a:schemeClr val="accent1"/>
+            </a:effectRef>
+            <a:fontRef idx="minor">
+              <a:schemeClr val="lt1"/>
+            </a:fontRef>
+          </p:style>
+          <p:txBody>
+            <a:bodyPr rtlCol="0" anchor="ctr"/>
+            <a:lstStyle/>
+            <a:p>
+              <a:pPr algn="ctr"/>
+              <a:endParaRPr lang="en-US" sz="1400" dirty="0"/>
+            </a:p>
+          </p:txBody>
+        </p:sp>
+        <p:sp>
+          <p:nvSpPr>
+            <p:cNvPr id="38" name="Rectangle 37">
+              <a:extLst>
+                <a:ext uri="{FF2B5EF4-FFF2-40B4-BE49-F238E27FC236}">
+                  <a16:creationId xmlns:a16="http://schemas.microsoft.com/office/drawing/2014/main" id="{A1A97936-6728-1D43-A485-A8BF1B2567F6}"/>
+                </a:ext>
+              </a:extLst>
+            </p:cNvPr>
+            <p:cNvSpPr/>
+            <p:nvPr/>
+          </p:nvSpPr>
+          <p:spPr>
+            <a:xfrm>
+              <a:off x="3412608" y="3515094"/>
+              <a:ext cx="1736610" cy="1724695"/>
+            </a:xfrm>
+            <a:prstGeom prst="rect">
+              <a:avLst/>
+            </a:prstGeom>
+            <a:solidFill>
+              <a:schemeClr val="accent6">
+                <a:lumMod val="50000"/>
+              </a:schemeClr>
+            </a:solidFill>
+            <a:ln>
+              <a:solidFill>
+                <a:schemeClr val="tx1"/>
+              </a:solidFill>
+            </a:ln>
+          </p:spPr>
+          <p:style>
+            <a:lnRef idx="2">
+              <a:schemeClr val="accent1">
+                <a:shade val="50000"/>
+              </a:schemeClr>
+            </a:lnRef>
+            <a:fillRef idx="1">
+              <a:schemeClr val="accent1"/>
+            </a:fillRef>
+            <a:effectRef idx="0">
+              <a:schemeClr val="accent1"/>
+            </a:effectRef>
+            <a:fontRef idx="minor">
+              <a:schemeClr val="lt1"/>
+            </a:fontRef>
+          </p:style>
+          <p:txBody>
+            <a:bodyPr rtlCol="0" anchor="ctr"/>
+            <a:lstStyle/>
+            <a:p>
+              <a:pPr algn="ctr"/>
+              <a:endParaRPr lang="en-US" sz="1400" dirty="0"/>
+            </a:p>
+          </p:txBody>
+        </p:sp>
+        <p:sp>
+          <p:nvSpPr>
+            <p:cNvPr id="39" name="Rectangle 38">
+              <a:extLst>
+                <a:ext uri="{FF2B5EF4-FFF2-40B4-BE49-F238E27FC236}">
+                  <a16:creationId xmlns:a16="http://schemas.microsoft.com/office/drawing/2014/main" id="{9A17EA51-D67B-6D4D-A097-D3E32F6CA8D6}"/>
+                </a:ext>
+              </a:extLst>
+            </p:cNvPr>
+            <p:cNvSpPr/>
+            <p:nvPr/>
+          </p:nvSpPr>
+          <p:spPr>
+            <a:xfrm>
+              <a:off x="5157207" y="3515094"/>
+              <a:ext cx="1736610" cy="1724695"/>
+            </a:xfrm>
+            <a:prstGeom prst="rect">
+              <a:avLst/>
+            </a:prstGeom>
+            <a:solidFill>
+              <a:schemeClr val="accent6">
+                <a:lumMod val="50000"/>
+              </a:schemeClr>
+            </a:solidFill>
+            <a:ln>
+              <a:solidFill>
+                <a:schemeClr val="tx1"/>
+              </a:solidFill>
+            </a:ln>
+          </p:spPr>
+          <p:style>
+            <a:lnRef idx="2">
+              <a:schemeClr val="accent1">
+                <a:shade val="50000"/>
+              </a:schemeClr>
+            </a:lnRef>
+            <a:fillRef idx="1">
+              <a:schemeClr val="accent1"/>
+            </a:fillRef>
+            <a:effectRef idx="0">
+              <a:schemeClr val="accent1"/>
+            </a:effectRef>
+            <a:fontRef idx="minor">
+              <a:schemeClr val="lt1"/>
+            </a:fontRef>
+          </p:style>
+          <p:txBody>
+            <a:bodyPr rtlCol="0" anchor="ctr"/>
+            <a:lstStyle/>
+            <a:p>
+              <a:pPr algn="ctr"/>
+              <a:endParaRPr lang="en-US" sz="1400" dirty="0"/>
+            </a:p>
+          </p:txBody>
+        </p:sp>
+        <p:sp>
+          <p:nvSpPr>
+            <p:cNvPr id="40" name="Rectangle 39">
+              <a:extLst>
+                <a:ext uri="{FF2B5EF4-FFF2-40B4-BE49-F238E27FC236}">
+                  <a16:creationId xmlns:a16="http://schemas.microsoft.com/office/drawing/2014/main" id="{4DCD7FBD-A272-9B45-903D-21A54E803287}"/>
+                </a:ext>
+              </a:extLst>
+            </p:cNvPr>
+            <p:cNvSpPr/>
+            <p:nvPr/>
+          </p:nvSpPr>
+          <p:spPr>
+            <a:xfrm>
+              <a:off x="6893817" y="3515094"/>
+              <a:ext cx="1736610" cy="1724695"/>
+            </a:xfrm>
+            <a:prstGeom prst="rect">
+              <a:avLst/>
+            </a:prstGeom>
+            <a:solidFill>
+              <a:schemeClr val="accent6">
+                <a:lumMod val="50000"/>
+              </a:schemeClr>
+            </a:solidFill>
+            <a:ln>
+              <a:solidFill>
+                <a:schemeClr val="tx1"/>
+              </a:solidFill>
+            </a:ln>
+          </p:spPr>
+          <p:style>
+            <a:lnRef idx="2">
+              <a:schemeClr val="accent1">
+                <a:shade val="50000"/>
+              </a:schemeClr>
+            </a:lnRef>
+            <a:fillRef idx="1">
+              <a:schemeClr val="accent1"/>
+            </a:fillRef>
+            <a:effectRef idx="0">
+              <a:schemeClr val="accent1"/>
+            </a:effectRef>
+            <a:fontRef idx="minor">
+              <a:schemeClr val="lt1"/>
+            </a:fontRef>
+          </p:style>
+          <p:txBody>
+            <a:bodyPr rtlCol="0" anchor="ctr"/>
+            <a:lstStyle/>
+            <a:p>
+              <a:pPr algn="ctr"/>
+              <a:endParaRPr lang="en-US" sz="1400" dirty="0"/>
+            </a:p>
+          </p:txBody>
+        </p:sp>
+        <p:sp>
+          <p:nvSpPr>
+            <p:cNvPr id="41" name="Rectangle 40">
+              <a:extLst>
+                <a:ext uri="{FF2B5EF4-FFF2-40B4-BE49-F238E27FC236}">
+                  <a16:creationId xmlns:a16="http://schemas.microsoft.com/office/drawing/2014/main" id="{5E222155-A1B2-2E41-872B-9060705F1FE2}"/>
+                </a:ext>
+              </a:extLst>
+            </p:cNvPr>
+            <p:cNvSpPr/>
+            <p:nvPr/>
+          </p:nvSpPr>
+          <p:spPr>
+            <a:xfrm>
+              <a:off x="5158057" y="65695"/>
+              <a:ext cx="1736610" cy="1724695"/>
+            </a:xfrm>
+            <a:prstGeom prst="rect">
+              <a:avLst/>
+            </a:prstGeom>
+            <a:solidFill>
+              <a:schemeClr val="accent6">
+                <a:lumMod val="50000"/>
+              </a:schemeClr>
+            </a:solidFill>
+            <a:ln>
+              <a:solidFill>
+                <a:schemeClr val="tx1"/>
+              </a:solidFill>
+            </a:ln>
+          </p:spPr>
+          <p:style>
+            <a:lnRef idx="2">
+              <a:schemeClr val="accent1">
+                <a:shade val="50000"/>
+              </a:schemeClr>
+            </a:lnRef>
+            <a:fillRef idx="1">
+              <a:schemeClr val="accent1"/>
+            </a:fillRef>
+            <a:effectRef idx="0">
+              <a:schemeClr val="accent1"/>
+            </a:effectRef>
+            <a:fontRef idx="minor">
+              <a:schemeClr val="lt1"/>
+            </a:fontRef>
+          </p:style>
+          <p:txBody>
+            <a:bodyPr rtlCol="0" anchor="ctr"/>
+            <a:lstStyle/>
+            <a:p>
+              <a:pPr algn="ctr"/>
+              <a:endParaRPr lang="en-US" sz="1400" dirty="0"/>
+            </a:p>
+          </p:txBody>
+        </p:sp>
+        <p:sp>
+          <p:nvSpPr>
+            <p:cNvPr id="42" name="Rectangle 41">
+              <a:extLst>
+                <a:ext uri="{FF2B5EF4-FFF2-40B4-BE49-F238E27FC236}">
+                  <a16:creationId xmlns:a16="http://schemas.microsoft.com/office/drawing/2014/main" id="{5E71E65B-0F53-4B4F-B2B3-0A4254701CA0}"/>
+                </a:ext>
+              </a:extLst>
+            </p:cNvPr>
+            <p:cNvSpPr/>
+            <p:nvPr/>
+          </p:nvSpPr>
+          <p:spPr>
+            <a:xfrm>
+              <a:off x="6893817" y="65700"/>
+              <a:ext cx="1736610" cy="1724695"/>
+            </a:xfrm>
+            <a:prstGeom prst="rect">
+              <a:avLst/>
+            </a:prstGeom>
+            <a:solidFill>
+              <a:schemeClr val="accent6">
+                <a:lumMod val="50000"/>
+              </a:schemeClr>
+            </a:solidFill>
+            <a:ln>
+              <a:solidFill>
+                <a:schemeClr val="tx1"/>
+              </a:solidFill>
+            </a:ln>
+          </p:spPr>
+          <p:style>
+            <a:lnRef idx="2">
+              <a:schemeClr val="accent1">
+                <a:shade val="50000"/>
+              </a:schemeClr>
+            </a:lnRef>
+            <a:fillRef idx="1">
+              <a:schemeClr val="accent1"/>
+            </a:fillRef>
+            <a:effectRef idx="0">
+              <a:schemeClr val="accent1"/>
+            </a:effectRef>
+            <a:fontRef idx="minor">
+              <a:schemeClr val="lt1"/>
+            </a:fontRef>
+          </p:style>
+          <p:txBody>
+            <a:bodyPr rtlCol="0" anchor="ctr"/>
+            <a:lstStyle/>
+            <a:p>
+              <a:pPr algn="ctr"/>
+              <a:endParaRPr lang="en-US" sz="1400" dirty="0"/>
+            </a:p>
+          </p:txBody>
+        </p:sp>
+        <p:sp>
+          <p:nvSpPr>
+            <p:cNvPr id="43" name="Rectangle 42">
+              <a:extLst>
+                <a:ext uri="{FF2B5EF4-FFF2-40B4-BE49-F238E27FC236}">
+                  <a16:creationId xmlns:a16="http://schemas.microsoft.com/office/drawing/2014/main" id="{EB7F7EA2-EA13-9545-8322-CC0C7132D21D}"/>
+                </a:ext>
+              </a:extLst>
+            </p:cNvPr>
+            <p:cNvSpPr/>
+            <p:nvPr/>
+          </p:nvSpPr>
+          <p:spPr>
+            <a:xfrm>
+              <a:off x="3412608" y="1785849"/>
+              <a:ext cx="1736610" cy="1724695"/>
+            </a:xfrm>
+            <a:prstGeom prst="rect">
+              <a:avLst/>
+            </a:prstGeom>
+            <a:solidFill>
+              <a:schemeClr val="accent6">
+                <a:lumMod val="50000"/>
+              </a:schemeClr>
+            </a:solidFill>
+            <a:ln>
+              <a:solidFill>
+                <a:schemeClr val="tx1"/>
+              </a:solidFill>
+            </a:ln>
+          </p:spPr>
+          <p:style>
+            <a:lnRef idx="2">
+              <a:schemeClr val="accent1">
+                <a:shade val="50000"/>
+              </a:schemeClr>
+            </a:lnRef>
+            <a:fillRef idx="1">
+              <a:schemeClr val="accent1"/>
+            </a:fillRef>
+            <a:effectRef idx="0">
+              <a:schemeClr val="accent1"/>
+            </a:effectRef>
+            <a:fontRef idx="minor">
+              <a:schemeClr val="lt1"/>
+            </a:fontRef>
+          </p:style>
+          <p:txBody>
+            <a:bodyPr rtlCol="0" anchor="ctr"/>
+            <a:lstStyle/>
+            <a:p>
+              <a:pPr algn="ctr"/>
+              <a:endParaRPr lang="en-US" sz="1400" dirty="0"/>
+            </a:p>
+          </p:txBody>
+        </p:sp>
+        <p:cxnSp>
+          <p:nvCxnSpPr>
+            <p:cNvPr id="46" name="Straight Connector 45">
+              <a:extLst>
+                <a:ext uri="{FF2B5EF4-FFF2-40B4-BE49-F238E27FC236}">
+                  <a16:creationId xmlns:a16="http://schemas.microsoft.com/office/drawing/2014/main" id="{94A81326-284F-824D-B0D0-3E3FA8019CD1}"/>
+                </a:ext>
+              </a:extLst>
+            </p:cNvPr>
+            <p:cNvCxnSpPr>
+              <a:cxnSpLocks/>
+            </p:cNvCxnSpPr>
+            <p:nvPr/>
+          </p:nvCxnSpPr>
+          <p:spPr>
+            <a:xfrm flipV="1">
+              <a:off x="5998876" y="771896"/>
+              <a:ext cx="1789216" cy="1969446"/>
+            </a:xfrm>
+            <a:prstGeom prst="line">
+              <a:avLst/>
+            </a:prstGeom>
+            <a:ln w="12700"/>
+          </p:spPr>
+          <p:style>
+            <a:lnRef idx="1">
+              <a:schemeClr val="dk1"/>
+            </a:lnRef>
+            <a:fillRef idx="0">
+              <a:schemeClr val="dk1"/>
+            </a:fillRef>
+            <a:effectRef idx="0">
+              <a:schemeClr val="dk1"/>
+            </a:effectRef>
+            <a:fontRef idx="minor">
+              <a:schemeClr val="tx1"/>
+            </a:fontRef>
+          </p:style>
+        </p:cxnSp>
+        <p:sp>
+          <p:nvSpPr>
+            <p:cNvPr id="47" name="TextBox 46">
+              <a:extLst>
+                <a:ext uri="{FF2B5EF4-FFF2-40B4-BE49-F238E27FC236}">
+                  <a16:creationId xmlns:a16="http://schemas.microsoft.com/office/drawing/2014/main" id="{39AA41A0-BB86-5B4B-A4F6-7C6341D8E9D8}"/>
+                </a:ext>
+              </a:extLst>
+            </p:cNvPr>
+            <p:cNvSpPr txBox="1"/>
+            <p:nvPr/>
+          </p:nvSpPr>
+          <p:spPr>
+            <a:xfrm rot="18758170">
+              <a:off x="6778026" y="973034"/>
+              <a:ext cx="1052249" cy="307777"/>
+            </a:xfrm>
+            <a:prstGeom prst="rect">
+              <a:avLst/>
+            </a:prstGeom>
+            <a:noFill/>
+          </p:spPr>
+          <p:txBody>
+            <a:bodyPr wrap="square" rtlCol="0">
+              <a:spAutoFit/>
+            </a:bodyPr>
+            <a:lstStyle/>
+            <a:p>
+              <a:r>
+                <a:rPr lang="en-US" sz="1400" b="1" dirty="0">
+                  <a:latin typeface="Helvetica" pitchFamily="2" charset="0"/>
+                </a:rPr>
+                <a:t>90 metres </a:t>
+              </a:r>
+            </a:p>
+          </p:txBody>
+        </p:sp>
+        <p:sp>
+          <p:nvSpPr>
+            <p:cNvPr id="48" name="Oval 47">
+              <a:extLst>
+                <a:ext uri="{FF2B5EF4-FFF2-40B4-BE49-F238E27FC236}">
+                  <a16:creationId xmlns:a16="http://schemas.microsoft.com/office/drawing/2014/main" id="{758EFF8E-9DDD-7148-8778-71B553DAF33E}"/>
+                </a:ext>
+              </a:extLst>
+            </p:cNvPr>
+            <p:cNvSpPr/>
+            <p:nvPr/>
+          </p:nvSpPr>
+          <p:spPr>
+            <a:xfrm>
+              <a:off x="3599714" y="161589"/>
+              <a:ext cx="5040744" cy="4805106"/>
+            </a:xfrm>
+            <a:prstGeom prst="ellipse">
+              <a:avLst/>
+            </a:prstGeom>
+            <a:solidFill>
+              <a:schemeClr val="tx1">
+                <a:lumMod val="95000"/>
+                <a:lumOff val="5000"/>
+                <a:alpha val="60000"/>
+              </a:schemeClr>
+            </a:solidFill>
+            <a:ln>
+              <a:solidFill>
+                <a:schemeClr val="tx1">
+                  <a:alpha val="0"/>
+                </a:schemeClr>
+              </a:solidFill>
+            </a:ln>
+          </p:spPr>
+          <p:style>
+            <a:lnRef idx="2">
+              <a:schemeClr val="accent1">
+                <a:shade val="50000"/>
+              </a:schemeClr>
+            </a:lnRef>
+            <a:fillRef idx="1">
+              <a:schemeClr val="accent1"/>
+            </a:fillRef>
+            <a:effectRef idx="0">
+              <a:schemeClr val="accent1"/>
+            </a:effectRef>
+            <a:fontRef idx="minor">
+              <a:schemeClr val="lt1"/>
+            </a:fontRef>
+          </p:style>
+          <p:txBody>
+            <a:bodyPr rtlCol="0" anchor="ctr"/>
+            <a:lstStyle/>
+            <a:p>
+              <a:pPr algn="ctr"/>
+              <a:endParaRPr lang="en-US"/>
+            </a:p>
+          </p:txBody>
+        </p:sp>
+      </p:grpSp>
+    </p:spTree>
+    <p:extLst>
+      <p:ext uri="{BB962C8B-B14F-4D97-AF65-F5344CB8AC3E}">
+        <p14:creationId xmlns:p14="http://schemas.microsoft.com/office/powerpoint/2010/main" val="4079484386"/>
+      </p:ext>
+    </p:extLst>
+  </p:cSld>
+  <p:clrMapOvr>
+    <a:masterClrMapping/>
+  </p:clrMapOvr>
+</p:sld>
+</file>
+
 <file path=ppt/theme/theme1.xml><?xml version="1.0" encoding="utf-8"?>
 <a:theme xmlns:a="http://schemas.openxmlformats.org/drawingml/2006/main" name="Office Theme">
   <a:themeElements>

</xml_diff>